<commit_message>
Update Aula 3 e 4 -Conceito de Gerenciamento em GPS.pptx
</commit_message>
<xml_diff>
--- a/Aulas 1ro Bim/Aula 3 e 4 -Conceito de Gerenciamento em GPS.pptx
+++ b/Aulas 1ro Bim/Aula 3 e 4 -Conceito de Gerenciamento em GPS.pptx
@@ -2,59 +2,59 @@
 <file path=ppt/presentation.xml><?xml version="1.0" encoding="utf-8"?>
 <p:presentation xmlns:a="http://schemas.openxmlformats.org/drawingml/2006/main" xmlns:r="http://schemas.openxmlformats.org/officeDocument/2006/relationships" xmlns:p="http://schemas.openxmlformats.org/presentationml/2006/main" showSpecialPlsOnTitleSld="0" saveSubsetFonts="1">
   <p:sldMasterIdLst>
-    <p:sldMasterId id="2147483696" r:id="rId1"/>
-    <p:sldMasterId id="2147483709" r:id="rId2"/>
+    <p:sldMasterId id="2147483696" r:id="rId4"/>
+    <p:sldMasterId id="2147483709" r:id="rId5"/>
   </p:sldMasterIdLst>
   <p:notesMasterIdLst>
-    <p:notesMasterId r:id="rId46"/>
+    <p:notesMasterId r:id="rId49"/>
   </p:notesMasterIdLst>
   <p:handoutMasterIdLst>
-    <p:handoutMasterId r:id="rId47"/>
+    <p:handoutMasterId r:id="rId50"/>
   </p:handoutMasterIdLst>
   <p:sldIdLst>
-    <p:sldId id="409" r:id="rId3"/>
-    <p:sldId id="256" r:id="rId4"/>
-    <p:sldId id="411" r:id="rId5"/>
-    <p:sldId id="410" r:id="rId6"/>
-    <p:sldId id="415" r:id="rId7"/>
-    <p:sldId id="416" r:id="rId8"/>
-    <p:sldId id="435" r:id="rId9"/>
-    <p:sldId id="412" r:id="rId10"/>
-    <p:sldId id="451" r:id="rId11"/>
-    <p:sldId id="452" r:id="rId12"/>
-    <p:sldId id="314" r:id="rId13"/>
-    <p:sldId id="453" r:id="rId14"/>
-    <p:sldId id="423" r:id="rId15"/>
-    <p:sldId id="437" r:id="rId16"/>
-    <p:sldId id="454" r:id="rId17"/>
-    <p:sldId id="434" r:id="rId18"/>
-    <p:sldId id="455" r:id="rId19"/>
-    <p:sldId id="444" r:id="rId20"/>
-    <p:sldId id="371" r:id="rId21"/>
-    <p:sldId id="372" r:id="rId22"/>
-    <p:sldId id="445" r:id="rId23"/>
-    <p:sldId id="373" r:id="rId24"/>
-    <p:sldId id="374" r:id="rId25"/>
-    <p:sldId id="375" r:id="rId26"/>
-    <p:sldId id="446" r:id="rId27"/>
-    <p:sldId id="447" r:id="rId28"/>
-    <p:sldId id="448" r:id="rId29"/>
-    <p:sldId id="449" r:id="rId30"/>
-    <p:sldId id="450" r:id="rId31"/>
-    <p:sldId id="320" r:id="rId32"/>
-    <p:sldId id="456" r:id="rId33"/>
-    <p:sldId id="324" r:id="rId34"/>
-    <p:sldId id="325" r:id="rId35"/>
-    <p:sldId id="458" r:id="rId36"/>
-    <p:sldId id="344" r:id="rId37"/>
-    <p:sldId id="345" r:id="rId38"/>
-    <p:sldId id="346" r:id="rId39"/>
-    <p:sldId id="347" r:id="rId40"/>
-    <p:sldId id="348" r:id="rId41"/>
-    <p:sldId id="349" r:id="rId42"/>
-    <p:sldId id="350" r:id="rId43"/>
-    <p:sldId id="457" r:id="rId44"/>
-    <p:sldId id="406" r:id="rId45"/>
+    <p:sldId id="409" r:id="rId6"/>
+    <p:sldId id="256" r:id="rId7"/>
+    <p:sldId id="411" r:id="rId8"/>
+    <p:sldId id="410" r:id="rId9"/>
+    <p:sldId id="415" r:id="rId10"/>
+    <p:sldId id="416" r:id="rId11"/>
+    <p:sldId id="435" r:id="rId12"/>
+    <p:sldId id="412" r:id="rId13"/>
+    <p:sldId id="451" r:id="rId14"/>
+    <p:sldId id="452" r:id="rId15"/>
+    <p:sldId id="314" r:id="rId16"/>
+    <p:sldId id="453" r:id="rId17"/>
+    <p:sldId id="423" r:id="rId18"/>
+    <p:sldId id="437" r:id="rId19"/>
+    <p:sldId id="454" r:id="rId20"/>
+    <p:sldId id="434" r:id="rId21"/>
+    <p:sldId id="455" r:id="rId22"/>
+    <p:sldId id="444" r:id="rId23"/>
+    <p:sldId id="371" r:id="rId24"/>
+    <p:sldId id="372" r:id="rId25"/>
+    <p:sldId id="445" r:id="rId26"/>
+    <p:sldId id="373" r:id="rId27"/>
+    <p:sldId id="374" r:id="rId28"/>
+    <p:sldId id="375" r:id="rId29"/>
+    <p:sldId id="446" r:id="rId30"/>
+    <p:sldId id="447" r:id="rId31"/>
+    <p:sldId id="448" r:id="rId32"/>
+    <p:sldId id="449" r:id="rId33"/>
+    <p:sldId id="450" r:id="rId34"/>
+    <p:sldId id="320" r:id="rId35"/>
+    <p:sldId id="456" r:id="rId36"/>
+    <p:sldId id="324" r:id="rId37"/>
+    <p:sldId id="325" r:id="rId38"/>
+    <p:sldId id="458" r:id="rId39"/>
+    <p:sldId id="344" r:id="rId40"/>
+    <p:sldId id="345" r:id="rId41"/>
+    <p:sldId id="346" r:id="rId42"/>
+    <p:sldId id="347" r:id="rId43"/>
+    <p:sldId id="348" r:id="rId44"/>
+    <p:sldId id="349" r:id="rId45"/>
+    <p:sldId id="350" r:id="rId46"/>
+    <p:sldId id="457" r:id="rId47"/>
+    <p:sldId id="406" r:id="rId48"/>
   </p:sldIdLst>
   <p:sldSz cx="9144000" cy="6858000" type="screen4x3"/>
   <p:notesSz cx="6854825" cy="9750425"/>
@@ -512,7 +512,7 @@
             <a:fld id="{3FD67FBA-55B5-41E6-AFE0-E19AEB1D0829}" type="slidenum">
               <a:rPr lang="pt-BR" altLang="pt-BR"/>
               <a:pPr/>
-              <a:t>‹nº›</a:t>
+              <a:t>‹#›</a:t>
             </a:fld>
             <a:endParaRPr lang="pt-BR" altLang="pt-BR"/>
           </a:p>
@@ -965,7 +965,7 @@
             <a:fld id="{964A0C6B-87B8-4209-A0E4-54B1CE30D4CB}" type="slidenum">
               <a:rPr lang="pt-BR" altLang="pt-BR"/>
               <a:pPr/>
-              <a:t>‹nº›</a:t>
+              <a:t>‹#›</a:t>
             </a:fld>
             <a:endParaRPr lang="pt-BR" altLang="pt-BR"/>
           </a:p>
@@ -5509,7 +5509,7 @@
           <a:p>
             <a:fld id="{8132BAC0-E50D-4212-B80D-823E33AFF914}" type="slidenum">
               <a:rPr lang="pt-BR" smtClean="0"/>
-              <a:t>‹nº›</a:t>
+              <a:t>‹#›</a:t>
             </a:fld>
             <a:endParaRPr lang="pt-BR"/>
           </a:p>
@@ -5670,7 +5670,7 @@
           <a:p>
             <a:fld id="{8132BAC0-E50D-4212-B80D-823E33AFF914}" type="slidenum">
               <a:rPr lang="pt-BR" smtClean="0"/>
-              <a:t>‹nº›</a:t>
+              <a:t>‹#›</a:t>
             </a:fld>
             <a:endParaRPr lang="pt-BR"/>
           </a:p>
@@ -5841,7 +5841,7 @@
           <a:p>
             <a:fld id="{8132BAC0-E50D-4212-B80D-823E33AFF914}" type="slidenum">
               <a:rPr lang="pt-BR" smtClean="0"/>
-              <a:t>‹nº›</a:t>
+              <a:t>‹#›</a:t>
             </a:fld>
             <a:endParaRPr lang="pt-BR"/>
           </a:p>
@@ -5966,7 +5966,7 @@
           <a:p>
             <a:fld id="{8132BAC0-E50D-4212-B80D-823E33AFF914}" type="slidenum">
               <a:rPr lang="pt-BR" smtClean="0"/>
-              <a:t>‹nº›</a:t>
+              <a:t>‹#›</a:t>
             </a:fld>
             <a:endParaRPr lang="pt-BR"/>
           </a:p>
@@ -6272,7 +6272,7 @@
             <a:fld id="{618F2EA1-AD69-4C47-A098-54AA6332AA71}" type="slidenum">
               <a:rPr lang="pt-BR" altLang="pt-BR" smtClean="0"/>
               <a:pPr/>
-              <a:t>‹nº›</a:t>
+              <a:t>‹#›</a:t>
             </a:fld>
             <a:endParaRPr lang="pt-BR" altLang="pt-BR"/>
           </a:p>
@@ -6411,7 +6411,7 @@
             <a:fld id="{63F498A9-4107-4ACB-8E5E-4BEF455CE75A}" type="slidenum">
               <a:rPr lang="pt-BR" altLang="pt-BR" smtClean="0"/>
               <a:pPr/>
-              <a:t>‹nº›</a:t>
+              <a:t>‹#›</a:t>
             </a:fld>
             <a:endParaRPr lang="pt-BR" altLang="pt-BR"/>
           </a:p>
@@ -6650,7 +6650,7 @@
             <a:fld id="{0939748C-7861-49BA-B918-59FF3DA14637}" type="slidenum">
               <a:rPr lang="pt-BR" altLang="pt-BR" smtClean="0"/>
               <a:pPr/>
-              <a:t>‹nº›</a:t>
+              <a:t>‹#›</a:t>
             </a:fld>
             <a:endParaRPr lang="pt-BR" altLang="pt-BR"/>
           </a:p>
@@ -7041,7 +7041,7 @@
             <a:fld id="{DFC8C3BD-FDB2-4C02-B403-DFF7FF713EDE}" type="slidenum">
               <a:rPr lang="pt-BR" altLang="pt-BR" smtClean="0"/>
               <a:pPr/>
-              <a:t>‹nº›</a:t>
+              <a:t>‹#›</a:t>
             </a:fld>
             <a:endParaRPr lang="pt-BR" altLang="pt-BR"/>
           </a:p>
@@ -7471,7 +7471,7 @@
             <a:fld id="{2DDFE4A2-43E5-438B-8415-B6593A35A262}" type="slidenum">
               <a:rPr lang="pt-BR" altLang="pt-BR" smtClean="0"/>
               <a:pPr/>
-              <a:t>‹nº›</a:t>
+              <a:t>‹#›</a:t>
             </a:fld>
             <a:endParaRPr lang="pt-BR" altLang="pt-BR"/>
           </a:p>
@@ -7558,7 +7558,7 @@
             <a:fld id="{C2519166-6EB7-4FFC-83F8-D039E9D4DAB2}" type="slidenum">
               <a:rPr lang="pt-BR" altLang="pt-BR" smtClean="0"/>
               <a:pPr/>
-              <a:t>‹nº›</a:t>
+              <a:t>‹#›</a:t>
             </a:fld>
             <a:endParaRPr lang="pt-BR" altLang="pt-BR"/>
           </a:p>
@@ -7668,7 +7668,7 @@
             <a:fld id="{DCDF9EC1-1343-4C2B-A9D1-C89E85976890}" type="slidenum">
               <a:rPr lang="pt-BR" altLang="pt-BR" smtClean="0"/>
               <a:pPr/>
-              <a:t>‹nº›</a:t>
+              <a:t>‹#›</a:t>
             </a:fld>
             <a:endParaRPr lang="pt-BR" altLang="pt-BR"/>
           </a:p>
@@ -7829,7 +7829,7 @@
           <a:p>
             <a:fld id="{8132BAC0-E50D-4212-B80D-823E33AFF914}" type="slidenum">
               <a:rPr lang="pt-BR" smtClean="0"/>
-              <a:t>‹nº›</a:t>
+              <a:t>‹#›</a:t>
             </a:fld>
             <a:endParaRPr lang="pt-BR"/>
           </a:p>
@@ -8089,7 +8089,7 @@
             <a:fld id="{2746AB83-4A7F-4F65-95D6-EA73CA15AF85}" type="slidenum">
               <a:rPr lang="pt-BR" altLang="pt-BR" smtClean="0"/>
               <a:pPr/>
-              <a:t>‹nº›</a:t>
+              <a:t>‹#›</a:t>
             </a:fld>
             <a:endParaRPr lang="pt-BR" altLang="pt-BR"/>
           </a:p>
@@ -8305,7 +8305,7 @@
             <a:fld id="{2C2ADD04-0438-40F9-9F42-9CBC1394CDF8}" type="slidenum">
               <a:rPr lang="pt-BR" altLang="pt-BR" smtClean="0"/>
               <a:pPr/>
-              <a:t>‹nº›</a:t>
+              <a:t>‹#›</a:t>
             </a:fld>
             <a:endParaRPr lang="pt-BR" altLang="pt-BR"/>
           </a:p>
@@ -8676,7 +8676,7 @@
             <a:fld id="{C50634E0-494A-4F05-A4F1-F41DC90806BB}" type="slidenum">
               <a:rPr lang="pt-BR" altLang="pt-BR" smtClean="0"/>
               <a:pPr/>
-              <a:t>‹nº›</a:t>
+              <a:t>‹#›</a:t>
             </a:fld>
             <a:endParaRPr lang="pt-BR" altLang="pt-BR"/>
           </a:p>
@@ -8848,7 +8848,7 @@
             <a:fld id="{8A888BF2-35AE-4A0C-8B4D-1B33B962AAE1}" type="slidenum">
               <a:rPr lang="pt-BR" altLang="pt-BR" smtClean="0"/>
               <a:pPr/>
-              <a:t>‹nº›</a:t>
+              <a:t>‹#›</a:t>
             </a:fld>
             <a:endParaRPr lang="pt-BR" altLang="pt-BR"/>
           </a:p>
@@ -9397,7 +9397,7 @@
           <a:p>
             <a:fld id="{8132BAC0-E50D-4212-B80D-823E33AFF914}" type="slidenum">
               <a:rPr lang="pt-BR" smtClean="0"/>
-              <a:t>‹nº›</a:t>
+              <a:t>‹#›</a:t>
             </a:fld>
             <a:endParaRPr lang="pt-BR"/>
           </a:p>
@@ -9653,7 +9653,7 @@
           <a:p>
             <a:fld id="{8132BAC0-E50D-4212-B80D-823E33AFF914}" type="slidenum">
               <a:rPr lang="pt-BR" smtClean="0"/>
-              <a:t>‹nº›</a:t>
+              <a:t>‹#›</a:t>
             </a:fld>
             <a:endParaRPr lang="pt-BR"/>
           </a:p>
@@ -10137,7 +10137,7 @@
           <a:p>
             <a:fld id="{8132BAC0-E50D-4212-B80D-823E33AFF914}" type="slidenum">
               <a:rPr lang="pt-BR" smtClean="0"/>
-              <a:t>‹nº›</a:t>
+              <a:t>‹#›</a:t>
             </a:fld>
             <a:endParaRPr lang="pt-BR"/>
           </a:p>
@@ -10246,7 +10246,7 @@
           <a:p>
             <a:fld id="{8132BAC0-E50D-4212-B80D-823E33AFF914}" type="slidenum">
               <a:rPr lang="pt-BR" smtClean="0"/>
-              <a:t>‹nº›</a:t>
+              <a:t>‹#›</a:t>
             </a:fld>
             <a:endParaRPr lang="pt-BR"/>
           </a:p>
@@ -10332,7 +10332,7 @@
           <a:p>
             <a:fld id="{8132BAC0-E50D-4212-B80D-823E33AFF914}" type="slidenum">
               <a:rPr lang="pt-BR" smtClean="0"/>
-              <a:t>‹nº›</a:t>
+              <a:t>‹#›</a:t>
             </a:fld>
             <a:endParaRPr lang="pt-BR"/>
           </a:p>
@@ -10780,7 +10780,7 @@
           <a:p>
             <a:fld id="{8132BAC0-E50D-4212-B80D-823E33AFF914}" type="slidenum">
               <a:rPr lang="pt-BR" smtClean="0"/>
-              <a:t>‹nº›</a:t>
+              <a:t>‹#›</a:t>
             </a:fld>
             <a:endParaRPr lang="pt-BR"/>
           </a:p>
@@ -11287,7 +11287,7 @@
           <a:p>
             <a:fld id="{8132BAC0-E50D-4212-B80D-823E33AFF914}" type="slidenum">
               <a:rPr lang="pt-BR" smtClean="0"/>
-              <a:t>‹nº›</a:t>
+              <a:t>‹#›</a:t>
             </a:fld>
             <a:endParaRPr lang="pt-BR"/>
           </a:p>
@@ -12162,7 +12162,7 @@
           <a:p>
             <a:fld id="{8132BAC0-E50D-4212-B80D-823E33AFF914}" type="slidenum">
               <a:rPr lang="pt-BR" smtClean="0"/>
-              <a:t>‹nº›</a:t>
+              <a:t>‹#›</a:t>
             </a:fld>
             <a:endParaRPr lang="pt-BR"/>
           </a:p>
@@ -12694,7 +12694,7 @@
             <a:fld id="{2644E1D9-A5D9-42C1-8946-3B1C55D029F9}" type="slidenum">
               <a:rPr lang="pt-BR" altLang="pt-BR" smtClean="0"/>
               <a:pPr/>
-              <a:t>‹nº›</a:t>
+              <a:t>‹#›</a:t>
             </a:fld>
             <a:endParaRPr lang="pt-BR" altLang="pt-BR"/>
           </a:p>
@@ -13506,7 +13506,7 @@
           <a:p>
             <a:pPr algn="ctr" fontAlgn="auto"/>
             <a:r>
-              <a:rPr lang="pt-BR" altLang="pt-BR" sz="4400" cap="small" dirty="0">
+              <a:rPr lang="pt-BR" altLang="pt-BR" sz="4400" cap="small">
                 <a:solidFill>
                   <a:schemeClr val="bg1"/>
                 </a:solidFill>
@@ -13519,7 +13519,23 @@
                 </a:effectLst>
                 <a:latin typeface="Amasis MT Pro Medium" panose="020B0604020202020204" pitchFamily="18" charset="0"/>
               </a:rPr>
-              <a:t>Projeto de Software de Software</a:t>
+              <a:t>Gestão de Projeto </a:t>
+            </a:r>
+            <a:r>
+              <a:rPr lang="pt-BR" altLang="pt-BR" sz="4400" cap="small" dirty="0">
+                <a:solidFill>
+                  <a:schemeClr val="bg1"/>
+                </a:solidFill>
+                <a:effectLst>
+                  <a:outerShdw blurRad="38100" dist="38100" dir="2700000" algn="tl">
+                    <a:srgbClr val="000000">
+                      <a:alpha val="43137"/>
+                    </a:srgbClr>
+                  </a:outerShdw>
+                </a:effectLst>
+                <a:latin typeface="Amasis MT Pro Medium" panose="020B0604020202020204" pitchFamily="18" charset="0"/>
+              </a:rPr>
+              <a:t>de Software</a:t>
             </a:r>
           </a:p>
           <a:p>
@@ -32028,12 +32044,12 @@
           <a:graphicData uri="http://schemas.openxmlformats.org/presentationml/2006/ole">
             <mc:AlternateContent xmlns:mc="http://schemas.openxmlformats.org/markup-compatibility/2006">
               <mc:Choice xmlns:v="urn:schemas-microsoft-com:vml" Requires="v">
-                <p:oleObj spid="_x0000_s2076" name="Microsoft Org Chart" r:id="rId4" imgW="5702040" imgH="4032000" progId="OrgPlusWOPX.4">
+                <p:oleObj name="Microsoft Org Chart" r:id="rId3" imgW="5702040" imgH="4032000" progId="OrgPlusWOPX.4">
                   <p:embed followColorScheme="full"/>
                 </p:oleObj>
               </mc:Choice>
               <mc:Fallback>
-                <p:oleObj name="Microsoft Org Chart" r:id="rId4" imgW="5702040" imgH="4032000" progId="OrgPlusWOPX.4">
+                <p:oleObj name="Microsoft Org Chart" r:id="rId3" imgW="5702040" imgH="4032000" progId="OrgPlusWOPX.4">
                   <p:embed followColorScheme="full"/>
                   <p:pic>
                     <p:nvPicPr>
@@ -32050,7 +32066,7 @@
                       <p:nvPr/>
                     </p:nvPicPr>
                     <p:blipFill>
-                      <a:blip r:embed="rId5"/>
+                      <a:blip r:embed="rId4"/>
                       <a:srcRect/>
                       <a:stretch>
                         <a:fillRect/>
@@ -41723,6 +41739,15 @@
 </file>
 
 <file path=customXml/item1.xml><?xml version="1.0" encoding="utf-8"?>
+<?mso-contentType ?>
+<FormTemplates xmlns="http://schemas.microsoft.com/sharepoint/v3/contenttype/forms">
+  <Display>DocumentLibraryForm</Display>
+  <Edit>DocumentLibraryForm</Edit>
+  <New>DocumentLibraryForm</New>
+</FormTemplates>
+</file>
+
+<file path=customXml/item2.xml><?xml version="1.0" encoding="utf-8"?>
 <ct:contentTypeSchema xmlns:ct="http://schemas.microsoft.com/office/2006/metadata/contentType" xmlns:ma="http://schemas.microsoft.com/office/2006/metadata/properties/metaAttributes" ct:_="" ma:_="" ma:contentTypeName="Documento" ma:contentTypeID="0x010100F52C5CF0618D9F429CEC3EBEA1BACF0E" ma:contentTypeVersion="0" ma:contentTypeDescription="Crie um novo documento." ma:contentTypeScope="" ma:versionID="c4cf412edfcad46e187462d1cee4d741">
   <xsd:schema xmlns:xsd="http://www.w3.org/2001/XMLSchema" xmlns:xs="http://www.w3.org/2001/XMLSchema" xmlns:p="http://schemas.microsoft.com/office/2006/metadata/properties" targetNamespace="http://schemas.microsoft.com/office/2006/metadata/properties" ma:root="true" ma:fieldsID="574c6ccb71ee63fbc30cff3237551ec3">
     <xsd:element name="properties">
@@ -41836,15 +41861,6 @@
 </ct:contentTypeSchema>
 </file>
 
-<file path=customXml/item2.xml><?xml version="1.0" encoding="utf-8"?>
-<?mso-contentType ?>
-<FormTemplates xmlns="http://schemas.microsoft.com/sharepoint/v3/contenttype/forms">
-  <Display>DocumentLibraryForm</Display>
-  <Edit>DocumentLibraryForm</Edit>
-  <New>DocumentLibraryForm</New>
-</FormTemplates>
-</file>
-
 <file path=customXml/item3.xml><?xml version="1.0" encoding="utf-8"?>
 <p:properties xmlns:p="http://schemas.microsoft.com/office/2006/metadata/properties" xmlns:xsi="http://www.w3.org/2001/XMLSchema-instance" xmlns:pc="http://schemas.microsoft.com/office/infopath/2007/PartnerControls">
   <documentManagement/>
@@ -41852,13 +41868,34 @@
 </file>
 
 <file path=customXml/itemProps1.xml><?xml version="1.0" encoding="utf-8"?>
-<ds:datastoreItem xmlns:ds="http://schemas.openxmlformats.org/officeDocument/2006/customXml" ds:itemID="{E9AF9500-22D5-4C74-BE0E-178884217520}"/>
+<ds:datastoreItem xmlns:ds="http://schemas.openxmlformats.org/officeDocument/2006/customXml" ds:itemID="{515B266D-F240-46D3-87BE-6B6CA9EA1C23}">
+  <ds:schemaRefs>
+    <ds:schemaRef ds:uri="http://schemas.microsoft.com/sharepoint/v3/contenttype/forms"/>
+  </ds:schemaRefs>
+</ds:datastoreItem>
 </file>
 
 <file path=customXml/itemProps2.xml><?xml version="1.0" encoding="utf-8"?>
-<ds:datastoreItem xmlns:ds="http://schemas.openxmlformats.org/officeDocument/2006/customXml" ds:itemID="{515B266D-F240-46D3-87BE-6B6CA9EA1C23}"/>
+<ds:datastoreItem xmlns:ds="http://schemas.openxmlformats.org/officeDocument/2006/customXml" ds:itemID="{E9AF9500-22D5-4C74-BE0E-178884217520}">
+  <ds:schemaRefs>
+    <ds:schemaRef ds:uri="http://schemas.microsoft.com/office/2006/metadata/contentType"/>
+    <ds:schemaRef ds:uri="http://schemas.microsoft.com/office/2006/metadata/properties/metaAttributes"/>
+    <ds:schemaRef ds:uri="http://www.w3.org/2001/XMLSchema"/>
+    <ds:schemaRef ds:uri="http://schemas.microsoft.com/office/2006/metadata/properties"/>
+    <ds:schemaRef ds:uri="http://schemas.openxmlformats.org/package/2006/metadata/core-properties"/>
+    <ds:schemaRef ds:uri="http://purl.org/dc/elements/1.1/"/>
+    <ds:schemaRef ds:uri="http://purl.org/dc/terms/"/>
+    <ds:schemaRef ds:uri="http://schemas.microsoft.com/internal/obd"/>
+    <ds:schemaRef ds:uri="http://schemas.microsoft.com/office/infopath/2007/PartnerControls"/>
+  </ds:schemaRefs>
+</ds:datastoreItem>
 </file>
 
 <file path=customXml/itemProps3.xml><?xml version="1.0" encoding="utf-8"?>
-<ds:datastoreItem xmlns:ds="http://schemas.openxmlformats.org/officeDocument/2006/customXml" ds:itemID="{CF2CA0EB-6416-400A-AA6F-B1D25D4FF04B}"/>
+<ds:datastoreItem xmlns:ds="http://schemas.openxmlformats.org/officeDocument/2006/customXml" ds:itemID="{CF2CA0EB-6416-400A-AA6F-B1D25D4FF04B}">
+  <ds:schemaRefs>
+    <ds:schemaRef ds:uri="http://schemas.microsoft.com/office/2006/metadata/properties"/>
+    <ds:schemaRef ds:uri="http://schemas.microsoft.com/office/infopath/2007/PartnerControls"/>
+  </ds:schemaRefs>
+</ds:datastoreItem>
 </file>
</xml_diff>